<commit_message>
bao cao tien do
</commit_message>
<xml_diff>
--- a/thesis/abs/SlideBaoCao_CSN.pptx
+++ b/thesis/abs/SlideBaoCao_CSN.pptx
@@ -240,7 +240,7 @@
           <a:p>
             <a:fld id="{C9249263-8DF9-4907-970E-1CFD040DC73A}" type="datetimeFigureOut">
               <a:rPr lang="en-US" smtClean="0"/>
-              <a:t>1/9/2025</a:t>
+              <a:t>1/11/2025</a:t>
             </a:fld>
             <a:endParaRPr lang="en-US" dirty="0"/>
           </a:p>
@@ -417,7 +417,7 @@
           <a:p>
             <a:fld id="{3C70B412-7BFF-46C7-AB5E-DE35F66C9933}" type="datetimeFigureOut">
               <a:rPr lang="en-US" noProof="0" smtClean="0"/>
-              <a:t>1/9/2025</a:t>
+              <a:t>1/11/2025</a:t>
             </a:fld>
             <a:endParaRPr lang="en-US" noProof="0" dirty="0"/>
           </a:p>
@@ -852,7 +852,7 @@
           <a:p>
             <a:fld id="{C1F93407-1483-4B80-86DE-DAE1D4D89093}" type="datetimeFigureOut">
               <a:rPr lang="en-US" noProof="0" smtClean="0"/>
-              <a:t>1/9/2025</a:t>
+              <a:t>1/11/2025</a:t>
             </a:fld>
             <a:endParaRPr lang="en-US" noProof="0" dirty="0"/>
           </a:p>
@@ -9609,7 +9609,7 @@
           <a:p>
             <a:fld id="{C1F93407-1483-4B80-86DE-DAE1D4D89093}" type="datetimeFigureOut">
               <a:rPr lang="en-US" noProof="0" smtClean="0"/>
-              <a:t>1/9/2025</a:t>
+              <a:t>1/11/2025</a:t>
             </a:fld>
             <a:endParaRPr lang="en-US" noProof="0" dirty="0"/>
           </a:p>
@@ -9829,7 +9829,7 @@
                 <a14:useLocalDpi xmlns:a14="http://schemas.microsoft.com/office/drawing/2010/main"/>
               </a:ext>
               <a:ext uri="{96DAC541-7B7A-43D3-8B79-37D633B846F1}">
-                <asvg:svgBlip xmlns:asvg="http://schemas.microsoft.com/office/drawing/2016/SVG/main" xmlns="" r:embed="rId3"/>
+                <asvg:svgBlip xmlns="" xmlns:asvg="http://schemas.microsoft.com/office/drawing/2016/SVG/main" r:embed="rId3"/>
               </a:ext>
             </a:extLst>
           </a:blip>
@@ -10235,7 +10235,7 @@
                 <a14:useLocalDpi xmlns:a14="http://schemas.microsoft.com/office/drawing/2010/main"/>
               </a:ext>
               <a:ext uri="{96DAC541-7B7A-43D3-8B79-37D633B846F1}">
-                <asvg:svgBlip xmlns:asvg="http://schemas.microsoft.com/office/drawing/2016/SVG/main" xmlns="" r:embed="rId5"/>
+                <asvg:svgBlip xmlns="" xmlns:asvg="http://schemas.microsoft.com/office/drawing/2016/SVG/main" r:embed="rId5"/>
               </a:ext>
             </a:extLst>
           </a:blip>
@@ -10434,7 +10434,7 @@
           <a:p>
             <a:fld id="{C1F93407-1483-4B80-86DE-DAE1D4D89093}" type="datetimeFigureOut">
               <a:rPr lang="en-US" noProof="0" smtClean="0"/>
-              <a:t>1/9/2025</a:t>
+              <a:t>1/11/2025</a:t>
             </a:fld>
             <a:endParaRPr lang="en-US" noProof="0" dirty="0"/>
           </a:p>
@@ -12236,7 +12236,7 @@
         </p:nvSpPr>
         <p:spPr>
           <a:xfrm>
-            <a:off x="0" y="2765490"/>
+            <a:off x="0" y="2705108"/>
             <a:ext cx="12192000" cy="2236815"/>
           </a:xfrm>
           <a:prstGeom prst="rect">
@@ -12517,7 +12517,7 @@
         </p:nvSpPr>
         <p:spPr>
           <a:xfrm>
-            <a:off x="822119" y="1600384"/>
+            <a:off x="822119" y="1557254"/>
             <a:ext cx="10779855" cy="979453"/>
           </a:xfrm>
           <a:prstGeom prst="rect">
@@ -12792,7 +12792,7 @@
         </p:nvSpPr>
         <p:spPr>
           <a:xfrm>
-            <a:off x="94891" y="5187958"/>
+            <a:off x="173307" y="5110324"/>
             <a:ext cx="3253554" cy="979453"/>
           </a:xfrm>
           <a:prstGeom prst="rect">
@@ -13060,7 +13060,7 @@
         </p:nvSpPr>
         <p:spPr>
           <a:xfrm>
-            <a:off x="8775495" y="5187958"/>
+            <a:off x="9155057" y="5110324"/>
             <a:ext cx="3275053" cy="1498551"/>
           </a:xfrm>
           <a:prstGeom prst="rect">
@@ -15333,7 +15333,7 @@
         </p:nvSpPr>
         <p:spPr>
           <a:xfrm>
-            <a:off x="8319278" y="2557593"/>
+            <a:off x="8491805" y="2372927"/>
             <a:ext cx="1205219" cy="369332"/>
           </a:xfrm>
           <a:prstGeom prst="rect">
@@ -15362,7 +15362,7 @@
         </p:nvSpPr>
         <p:spPr>
           <a:xfrm>
-            <a:off x="1057011" y="2557593"/>
+            <a:off x="1212287" y="2372927"/>
             <a:ext cx="1159292" cy="369332"/>
           </a:xfrm>
           <a:prstGeom prst="rect">
@@ -15391,8 +15391,8 @@
         </p:nvSpPr>
         <p:spPr>
           <a:xfrm>
-            <a:off x="822119" y="2926925"/>
-            <a:ext cx="5360567" cy="3493264"/>
+            <a:off x="822119" y="2770709"/>
+            <a:ext cx="6178252" cy="4016484"/>
           </a:xfrm>
           <a:prstGeom prst="rect">
             <a:avLst/>
@@ -15405,7 +15405,7 @@
           <a:lstStyle/>
           <a:p>
             <a:r>
-              <a:rPr lang="en-US" sz="1300" dirty="0" err="1">
+              <a:rPr lang="en-US" sz="1500" dirty="0" err="1">
                 <a:latin typeface="Tahoma" panose="020B0604030504040204" pitchFamily="34" charset="0"/>
                 <a:ea typeface="Tahoma" panose="020B0604030504040204" pitchFamily="34" charset="0"/>
                 <a:cs typeface="Tahoma" panose="020B0604030504040204" pitchFamily="34" charset="0"/>
@@ -15413,7 +15413,7 @@
               <a:t>db.sinhVien.aggregate</a:t>
             </a:r>
             <a:r>
-              <a:rPr lang="en-US" sz="1300" dirty="0">
+              <a:rPr lang="en-US" sz="1500" dirty="0">
                 <a:latin typeface="Tahoma" panose="020B0604030504040204" pitchFamily="34" charset="0"/>
                 <a:ea typeface="Tahoma" panose="020B0604030504040204" pitchFamily="34" charset="0"/>
                 <a:cs typeface="Tahoma" panose="020B0604030504040204" pitchFamily="34" charset="0"/>
@@ -15423,7 +15423,7 @@
           </a:p>
           <a:p>
             <a:r>
-              <a:rPr lang="en-US" sz="1300" dirty="0">
+              <a:rPr lang="en-US" sz="1500" dirty="0">
                 <a:latin typeface="Tahoma" panose="020B0604030504040204" pitchFamily="34" charset="0"/>
                 <a:ea typeface="Tahoma" panose="020B0604030504040204" pitchFamily="34" charset="0"/>
                 <a:cs typeface="Tahoma" panose="020B0604030504040204" pitchFamily="34" charset="0"/>
@@ -15433,7 +15433,7 @@
           </a:p>
           <a:p>
             <a:r>
-              <a:rPr lang="en-US" sz="1300" dirty="0">
+              <a:rPr lang="en-US" sz="1500" dirty="0">
                 <a:latin typeface="Tahoma" panose="020B0604030504040204" pitchFamily="34" charset="0"/>
                 <a:ea typeface="Tahoma" panose="020B0604030504040204" pitchFamily="34" charset="0"/>
                 <a:cs typeface="Tahoma" panose="020B0604030504040204" pitchFamily="34" charset="0"/>
@@ -15443,7 +15443,7 @@
           </a:p>
           <a:p>
             <a:r>
-              <a:rPr lang="en-US" sz="1300" dirty="0">
+              <a:rPr lang="en-US" sz="1500" dirty="0">
                 <a:latin typeface="Tahoma" panose="020B0604030504040204" pitchFamily="34" charset="0"/>
                 <a:ea typeface="Tahoma" panose="020B0604030504040204" pitchFamily="34" charset="0"/>
                 <a:cs typeface="Tahoma" panose="020B0604030504040204" pitchFamily="34" charset="0"/>
@@ -15453,7 +15453,7 @@
           </a:p>
           <a:p>
             <a:r>
-              <a:rPr lang="en-US" sz="1300" dirty="0">
+              <a:rPr lang="en-US" sz="1500" dirty="0">
                 <a:latin typeface="Tahoma" panose="020B0604030504040204" pitchFamily="34" charset="0"/>
                 <a:ea typeface="Tahoma" panose="020B0604030504040204" pitchFamily="34" charset="0"/>
                 <a:cs typeface="Tahoma" panose="020B0604030504040204" pitchFamily="34" charset="0"/>
@@ -15461,7 +15461,7 @@
               <a:t>        </a:t>
             </a:r>
             <a:r>
-              <a:rPr lang="en-US" sz="1300" dirty="0" err="1">
+              <a:rPr lang="en-US" sz="1500" dirty="0" err="1">
                 <a:latin typeface="Tahoma" panose="020B0604030504040204" pitchFamily="34" charset="0"/>
                 <a:ea typeface="Tahoma" panose="020B0604030504040204" pitchFamily="34" charset="0"/>
                 <a:cs typeface="Tahoma" panose="020B0604030504040204" pitchFamily="34" charset="0"/>
@@ -15469,7 +15469,7 @@
               <a:t>khoa</a:t>
             </a:r>
             <a:r>
-              <a:rPr lang="en-US" sz="1300" dirty="0">
+              <a:rPr lang="en-US" sz="1500" dirty="0">
                 <a:latin typeface="Tahoma" panose="020B0604030504040204" pitchFamily="34" charset="0"/>
                 <a:ea typeface="Tahoma" panose="020B0604030504040204" pitchFamily="34" charset="0"/>
                 <a:cs typeface="Tahoma" panose="020B0604030504040204" pitchFamily="34" charset="0"/>
@@ -15477,7 +15477,7 @@
               <a:t>: "$</a:t>
             </a:r>
             <a:r>
-              <a:rPr lang="en-US" sz="1300" dirty="0" err="1">
+              <a:rPr lang="en-US" sz="1500" dirty="0" err="1">
                 <a:latin typeface="Tahoma" panose="020B0604030504040204" pitchFamily="34" charset="0"/>
                 <a:ea typeface="Tahoma" panose="020B0604030504040204" pitchFamily="34" charset="0"/>
                 <a:cs typeface="Tahoma" panose="020B0604030504040204" pitchFamily="34" charset="0"/>
@@ -15485,7 +15485,7 @@
               <a:t>sinhVien.thongtinsv.khoa</a:t>
             </a:r>
             <a:r>
-              <a:rPr lang="en-US" sz="1300" dirty="0">
+              <a:rPr lang="en-US" sz="1500" dirty="0">
                 <a:latin typeface="Tahoma" panose="020B0604030504040204" pitchFamily="34" charset="0"/>
                 <a:ea typeface="Tahoma" panose="020B0604030504040204" pitchFamily="34" charset="0"/>
                 <a:cs typeface="Tahoma" panose="020B0604030504040204" pitchFamily="34" charset="0"/>
@@ -15495,7 +15495,7 @@
           </a:p>
           <a:p>
             <a:r>
-              <a:rPr lang="en-US" sz="1300" dirty="0">
+              <a:rPr lang="en-US" sz="1500" dirty="0">
                 <a:latin typeface="Tahoma" panose="020B0604030504040204" pitchFamily="34" charset="0"/>
                 <a:ea typeface="Tahoma" panose="020B0604030504040204" pitchFamily="34" charset="0"/>
                 <a:cs typeface="Tahoma" panose="020B0604030504040204" pitchFamily="34" charset="0"/>
@@ -15505,7 +15505,7 @@
           </a:p>
           <a:p>
             <a:r>
-              <a:rPr lang="en-US" sz="1300" dirty="0">
+              <a:rPr lang="en-US" sz="1500" dirty="0">
                 <a:latin typeface="Tahoma" panose="020B0604030504040204" pitchFamily="34" charset="0"/>
                 <a:ea typeface="Tahoma" panose="020B0604030504040204" pitchFamily="34" charset="0"/>
                 <a:cs typeface="Tahoma" panose="020B0604030504040204" pitchFamily="34" charset="0"/>
@@ -15513,7 +15513,7 @@
               <a:t>      </a:t>
             </a:r>
             <a:r>
-              <a:rPr lang="en-US" sz="1300" dirty="0" err="1">
+              <a:rPr lang="en-US" sz="1500" dirty="0" err="1">
                 <a:latin typeface="Tahoma" panose="020B0604030504040204" pitchFamily="34" charset="0"/>
                 <a:ea typeface="Tahoma" panose="020B0604030504040204" pitchFamily="34" charset="0"/>
                 <a:cs typeface="Tahoma" panose="020B0604030504040204" pitchFamily="34" charset="0"/>
@@ -15521,7 +15521,7 @@
               <a:t>danhSachNganh</a:t>
             </a:r>
             <a:r>
-              <a:rPr lang="en-US" sz="1300" dirty="0">
+              <a:rPr lang="en-US" sz="1500" dirty="0">
                 <a:latin typeface="Tahoma" panose="020B0604030504040204" pitchFamily="34" charset="0"/>
                 <a:ea typeface="Tahoma" panose="020B0604030504040204" pitchFamily="34" charset="0"/>
                 <a:cs typeface="Tahoma" panose="020B0604030504040204" pitchFamily="34" charset="0"/>
@@ -15529,7 +15529,7 @@
               <a:t>: </a:t>
             </a:r>
             <a:r>
-              <a:rPr lang="en-US" sz="1300" dirty="0" smtClean="0">
+              <a:rPr lang="en-US" sz="1500" dirty="0" smtClean="0">
                 <a:latin typeface="Tahoma" panose="020B0604030504040204" pitchFamily="34" charset="0"/>
                 <a:ea typeface="Tahoma" panose="020B0604030504040204" pitchFamily="34" charset="0"/>
                 <a:cs typeface="Tahoma" panose="020B0604030504040204" pitchFamily="34" charset="0"/>
@@ -15537,7 +15537,7 @@
               <a:t>{$</a:t>
             </a:r>
             <a:r>
-              <a:rPr lang="en-US" sz="1300" dirty="0" err="1">
+              <a:rPr lang="en-US" sz="1500" dirty="0" err="1">
                 <a:latin typeface="Tahoma" panose="020B0604030504040204" pitchFamily="34" charset="0"/>
                 <a:ea typeface="Tahoma" panose="020B0604030504040204" pitchFamily="34" charset="0"/>
                 <a:cs typeface="Tahoma" panose="020B0604030504040204" pitchFamily="34" charset="0"/>
@@ -15545,7 +15545,7 @@
               <a:t>addToSet</a:t>
             </a:r>
             <a:r>
-              <a:rPr lang="en-US" sz="1300" dirty="0">
+              <a:rPr lang="en-US" sz="1500" dirty="0">
                 <a:latin typeface="Tahoma" panose="020B0604030504040204" pitchFamily="34" charset="0"/>
                 <a:ea typeface="Tahoma" panose="020B0604030504040204" pitchFamily="34" charset="0"/>
                 <a:cs typeface="Tahoma" panose="020B0604030504040204" pitchFamily="34" charset="0"/>
@@ -15553,7 +15553,7 @@
               <a:t>: "$</a:t>
             </a:r>
             <a:r>
-              <a:rPr lang="en-US" sz="1300" dirty="0" err="1">
+              <a:rPr lang="en-US" sz="1500" dirty="0" err="1">
                 <a:latin typeface="Tahoma" panose="020B0604030504040204" pitchFamily="34" charset="0"/>
                 <a:ea typeface="Tahoma" panose="020B0604030504040204" pitchFamily="34" charset="0"/>
                 <a:cs typeface="Tahoma" panose="020B0604030504040204" pitchFamily="34" charset="0"/>
@@ -15561,14 +15561,14 @@
               <a:t>sinhVien.thongtinsv.nganh</a:t>
             </a:r>
             <a:r>
-              <a:rPr lang="en-US" sz="1300" dirty="0" smtClean="0">
+              <a:rPr lang="en-US" sz="1500" dirty="0" smtClean="0">
                 <a:latin typeface="Tahoma" panose="020B0604030504040204" pitchFamily="34" charset="0"/>
                 <a:ea typeface="Tahoma" panose="020B0604030504040204" pitchFamily="34" charset="0"/>
                 <a:cs typeface="Tahoma" panose="020B0604030504040204" pitchFamily="34" charset="0"/>
               </a:rPr>
               <a:t>"}</a:t>
             </a:r>
-            <a:endParaRPr lang="en-US" sz="1300" dirty="0">
+            <a:endParaRPr lang="en-US" sz="1500" dirty="0">
               <a:latin typeface="Tahoma" panose="020B0604030504040204" pitchFamily="34" charset="0"/>
               <a:ea typeface="Tahoma" panose="020B0604030504040204" pitchFamily="34" charset="0"/>
               <a:cs typeface="Tahoma" panose="020B0604030504040204" pitchFamily="34" charset="0"/>
@@ -15576,7 +15576,7 @@
           </a:p>
           <a:p>
             <a:r>
-              <a:rPr lang="en-US" sz="1300" dirty="0">
+              <a:rPr lang="en-US" sz="1500" dirty="0">
                 <a:latin typeface="Tahoma" panose="020B0604030504040204" pitchFamily="34" charset="0"/>
                 <a:ea typeface="Tahoma" panose="020B0604030504040204" pitchFamily="34" charset="0"/>
                 <a:cs typeface="Tahoma" panose="020B0604030504040204" pitchFamily="34" charset="0"/>
@@ -15586,7 +15586,7 @@
           </a:p>
           <a:p>
             <a:r>
-              <a:rPr lang="en-US" sz="1300" dirty="0">
+              <a:rPr lang="en-US" sz="1500" dirty="0">
                 <a:latin typeface="Tahoma" panose="020B0604030504040204" pitchFamily="34" charset="0"/>
                 <a:ea typeface="Tahoma" panose="020B0604030504040204" pitchFamily="34" charset="0"/>
                 <a:cs typeface="Tahoma" panose="020B0604030504040204" pitchFamily="34" charset="0"/>
@@ -15596,7 +15596,7 @@
           </a:p>
           <a:p>
             <a:r>
-              <a:rPr lang="en-US" sz="1300" dirty="0">
+              <a:rPr lang="en-US" sz="1500" dirty="0">
                 <a:latin typeface="Tahoma" panose="020B0604030504040204" pitchFamily="34" charset="0"/>
                 <a:ea typeface="Tahoma" panose="020B0604030504040204" pitchFamily="34" charset="0"/>
                 <a:cs typeface="Tahoma" panose="020B0604030504040204" pitchFamily="34" charset="0"/>
@@ -15606,7 +15606,7 @@
           </a:p>
           <a:p>
             <a:r>
-              <a:rPr lang="en-US" sz="1300" dirty="0">
+              <a:rPr lang="en-US" sz="1500" dirty="0">
                 <a:latin typeface="Tahoma" panose="020B0604030504040204" pitchFamily="34" charset="0"/>
                 <a:ea typeface="Tahoma" panose="020B0604030504040204" pitchFamily="34" charset="0"/>
                 <a:cs typeface="Tahoma" panose="020B0604030504040204" pitchFamily="34" charset="0"/>
@@ -15616,7 +15616,7 @@
           </a:p>
           <a:p>
             <a:r>
-              <a:rPr lang="en-US" sz="1300" dirty="0">
+              <a:rPr lang="en-US" sz="1500" dirty="0">
                 <a:latin typeface="Tahoma" panose="020B0604030504040204" pitchFamily="34" charset="0"/>
                 <a:ea typeface="Tahoma" panose="020B0604030504040204" pitchFamily="34" charset="0"/>
                 <a:cs typeface="Tahoma" panose="020B0604030504040204" pitchFamily="34" charset="0"/>
@@ -15624,7 +15624,7 @@
               <a:t>      </a:t>
             </a:r>
             <a:r>
-              <a:rPr lang="en-US" sz="1300" dirty="0" err="1">
+              <a:rPr lang="en-US" sz="1500" dirty="0" err="1">
                 <a:latin typeface="Tahoma" panose="020B0604030504040204" pitchFamily="34" charset="0"/>
                 <a:ea typeface="Tahoma" panose="020B0604030504040204" pitchFamily="34" charset="0"/>
                 <a:cs typeface="Tahoma" panose="020B0604030504040204" pitchFamily="34" charset="0"/>
@@ -15632,7 +15632,7 @@
               <a:t>khoa</a:t>
             </a:r>
             <a:r>
-              <a:rPr lang="en-US" sz="1300" dirty="0">
+              <a:rPr lang="en-US" sz="1500" dirty="0">
                 <a:latin typeface="Tahoma" panose="020B0604030504040204" pitchFamily="34" charset="0"/>
                 <a:ea typeface="Tahoma" panose="020B0604030504040204" pitchFamily="34" charset="0"/>
                 <a:cs typeface="Tahoma" panose="020B0604030504040204" pitchFamily="34" charset="0"/>
@@ -15640,7 +15640,7 @@
               <a:t>: "$_</a:t>
             </a:r>
             <a:r>
-              <a:rPr lang="en-US" sz="1300" dirty="0" err="1">
+              <a:rPr lang="en-US" sz="1500" dirty="0" err="1">
                 <a:latin typeface="Tahoma" panose="020B0604030504040204" pitchFamily="34" charset="0"/>
                 <a:ea typeface="Tahoma" panose="020B0604030504040204" pitchFamily="34" charset="0"/>
                 <a:cs typeface="Tahoma" panose="020B0604030504040204" pitchFamily="34" charset="0"/>
@@ -15648,7 +15648,7 @@
               <a:t>id.khoa</a:t>
             </a:r>
             <a:r>
-              <a:rPr lang="en-US" sz="1300" dirty="0">
+              <a:rPr lang="en-US" sz="1500" dirty="0">
                 <a:latin typeface="Tahoma" panose="020B0604030504040204" pitchFamily="34" charset="0"/>
                 <a:ea typeface="Tahoma" panose="020B0604030504040204" pitchFamily="34" charset="0"/>
                 <a:cs typeface="Tahoma" panose="020B0604030504040204" pitchFamily="34" charset="0"/>
@@ -15658,7 +15658,7 @@
           </a:p>
           <a:p>
             <a:r>
-              <a:rPr lang="en-US" sz="1300" dirty="0">
+              <a:rPr lang="en-US" sz="1500" dirty="0">
                 <a:latin typeface="Tahoma" panose="020B0604030504040204" pitchFamily="34" charset="0"/>
                 <a:ea typeface="Tahoma" panose="020B0604030504040204" pitchFamily="34" charset="0"/>
                 <a:cs typeface="Tahoma" panose="020B0604030504040204" pitchFamily="34" charset="0"/>
@@ -15666,7 +15666,7 @@
               <a:t>      </a:t>
             </a:r>
             <a:r>
-              <a:rPr lang="en-US" sz="1300" dirty="0" err="1">
+              <a:rPr lang="en-US" sz="1500" dirty="0" err="1">
                 <a:latin typeface="Tahoma" panose="020B0604030504040204" pitchFamily="34" charset="0"/>
                 <a:ea typeface="Tahoma" panose="020B0604030504040204" pitchFamily="34" charset="0"/>
                 <a:cs typeface="Tahoma" panose="020B0604030504040204" pitchFamily="34" charset="0"/>
@@ -15674,7 +15674,7 @@
               <a:t>danhSachNganh</a:t>
             </a:r>
             <a:r>
-              <a:rPr lang="en-US" sz="1300" dirty="0">
+              <a:rPr lang="en-US" sz="1500" dirty="0">
                 <a:latin typeface="Tahoma" panose="020B0604030504040204" pitchFamily="34" charset="0"/>
                 <a:ea typeface="Tahoma" panose="020B0604030504040204" pitchFamily="34" charset="0"/>
                 <a:cs typeface="Tahoma" panose="020B0604030504040204" pitchFamily="34" charset="0"/>
@@ -15684,7 +15684,7 @@
           </a:p>
           <a:p>
             <a:r>
-              <a:rPr lang="en-US" sz="1300" dirty="0">
+              <a:rPr lang="en-US" sz="1500" dirty="0">
                 <a:latin typeface="Tahoma" panose="020B0604030504040204" pitchFamily="34" charset="0"/>
                 <a:ea typeface="Tahoma" panose="020B0604030504040204" pitchFamily="34" charset="0"/>
                 <a:cs typeface="Tahoma" panose="020B0604030504040204" pitchFamily="34" charset="0"/>
@@ -15694,7 +15694,7 @@
           </a:p>
           <a:p>
             <a:r>
-              <a:rPr lang="en-US" sz="1300" dirty="0">
+              <a:rPr lang="en-US" sz="1500" dirty="0">
                 <a:latin typeface="Tahoma" panose="020B0604030504040204" pitchFamily="34" charset="0"/>
                 <a:ea typeface="Tahoma" panose="020B0604030504040204" pitchFamily="34" charset="0"/>
                 <a:cs typeface="Tahoma" panose="020B0604030504040204" pitchFamily="34" charset="0"/>
@@ -15704,7 +15704,7 @@
           </a:p>
           <a:p>
             <a:r>
-              <a:rPr lang="en-US" sz="1300" dirty="0">
+              <a:rPr lang="en-US" sz="1500" dirty="0">
                 <a:latin typeface="Tahoma" panose="020B0604030504040204" pitchFamily="34" charset="0"/>
                 <a:ea typeface="Tahoma" panose="020B0604030504040204" pitchFamily="34" charset="0"/>
                 <a:cs typeface="Tahoma" panose="020B0604030504040204" pitchFamily="34" charset="0"/>
@@ -15714,7 +15714,7 @@
           </a:p>
           <a:p>
             <a:r>
-              <a:rPr lang="en-US" sz="1300" dirty="0">
+              <a:rPr lang="en-US" sz="1500" dirty="0">
                 <a:latin typeface="Tahoma" panose="020B0604030504040204" pitchFamily="34" charset="0"/>
                 <a:ea typeface="Tahoma" panose="020B0604030504040204" pitchFamily="34" charset="0"/>
                 <a:cs typeface="Tahoma" panose="020B0604030504040204" pitchFamily="34" charset="0"/>
@@ -15732,7 +15732,7 @@
         </p:nvSpPr>
         <p:spPr>
           <a:xfrm>
-            <a:off x="7000373" y="2926925"/>
+            <a:off x="7602981" y="2770709"/>
             <a:ext cx="3843031" cy="3785652"/>
           </a:xfrm>
           <a:prstGeom prst="rect">
@@ -25067,7 +25067,7 @@
         <p:spPr>
           <a:xfrm>
             <a:off x="922788" y="3123591"/>
-            <a:ext cx="4152132" cy="2585323"/>
+            <a:ext cx="4152132" cy="2862322"/>
           </a:xfrm>
           <a:prstGeom prst="rect">
             <a:avLst/>
@@ -25291,6 +25291,29 @@
                 <a:cs typeface="Tahoma" panose="020B0604030504040204" pitchFamily="34" charset="0"/>
               </a:rPr>
               <a:t>    _id: 0 </a:t>
+            </a:r>
+            <a:endParaRPr lang="vi-VN" dirty="0" smtClean="0">
+              <a:latin typeface="Tahoma" panose="020B0604030504040204" pitchFamily="34" charset="0"/>
+              <a:ea typeface="Tahoma" panose="020B0604030504040204" pitchFamily="34" charset="0"/>
+              <a:cs typeface="Tahoma" panose="020B0604030504040204" pitchFamily="34" charset="0"/>
+            </a:endParaRPr>
+          </a:p>
+          <a:p>
+            <a:r>
+              <a:rPr lang="vi-VN" dirty="0">
+                <a:latin typeface="Tahoma" panose="020B0604030504040204" pitchFamily="34" charset="0"/>
+                <a:ea typeface="Tahoma" panose="020B0604030504040204" pitchFamily="34" charset="0"/>
+                <a:cs typeface="Tahoma" panose="020B0604030504040204" pitchFamily="34" charset="0"/>
+              </a:rPr>
+              <a:t> </a:t>
+            </a:r>
+            <a:r>
+              <a:rPr lang="vi-VN" dirty="0" smtClean="0">
+                <a:latin typeface="Tahoma" panose="020B0604030504040204" pitchFamily="34" charset="0"/>
+                <a:ea typeface="Tahoma" panose="020B0604030504040204" pitchFamily="34" charset="0"/>
+                <a:cs typeface="Tahoma" panose="020B0604030504040204" pitchFamily="34" charset="0"/>
+              </a:rPr>
+              <a:t> </a:t>
             </a:r>
             <a:r>
               <a:rPr lang="en-US" dirty="0" smtClean="0">
@@ -25414,7 +25437,15 @@
                 <a:ea typeface="Tahoma" panose="020B0604030504040204" pitchFamily="34" charset="0"/>
                 <a:cs typeface="Tahoma" panose="020B0604030504040204" pitchFamily="34" charset="0"/>
               </a:rPr>
-              <a:t>	</a:t>
+              <a:t> </a:t>
+            </a:r>
+            <a:r>
+              <a:rPr lang="vi-VN" dirty="0" smtClean="0">
+                <a:latin typeface="Tahoma" panose="020B0604030504040204" pitchFamily="34" charset="0"/>
+                <a:ea typeface="Tahoma" panose="020B0604030504040204" pitchFamily="34" charset="0"/>
+                <a:cs typeface="Tahoma" panose="020B0604030504040204" pitchFamily="34" charset="0"/>
+              </a:rPr>
+              <a:t>    </a:t>
             </a:r>
             <a:r>
               <a:rPr lang="en-US" dirty="0" err="1" smtClean="0">
@@ -25445,7 +25476,7 @@
                 <a:ea typeface="Tahoma" panose="020B0604030504040204" pitchFamily="34" charset="0"/>
                 <a:cs typeface="Tahoma" panose="020B0604030504040204" pitchFamily="34" charset="0"/>
               </a:rPr>
-              <a:t>		</a:t>
+              <a:t>	</a:t>
             </a:r>
             <a:r>
               <a:rPr lang="en-US" dirty="0" err="1" smtClean="0">
@@ -25479,14 +25510,6 @@
               <a:t>	</a:t>
             </a:r>
             <a:r>
-              <a:rPr lang="vi-VN" dirty="0" smtClean="0">
-                <a:latin typeface="Tahoma" panose="020B0604030504040204" pitchFamily="34" charset="0"/>
-                <a:ea typeface="Tahoma" panose="020B0604030504040204" pitchFamily="34" charset="0"/>
-                <a:cs typeface="Tahoma" panose="020B0604030504040204" pitchFamily="34" charset="0"/>
-              </a:rPr>
-              <a:t>	</a:t>
-            </a:r>
-            <a:r>
               <a:rPr lang="en-US" dirty="0" err="1" smtClean="0">
                 <a:latin typeface="Tahoma" panose="020B0604030504040204" pitchFamily="34" charset="0"/>
                 <a:ea typeface="Tahoma" panose="020B0604030504040204" pitchFamily="34" charset="0"/>
@@ -25550,14 +25573,6 @@
               <a:t>	</a:t>
             </a:r>
             <a:r>
-              <a:rPr lang="vi-VN" dirty="0" smtClean="0">
-                <a:latin typeface="Tahoma" panose="020B0604030504040204" pitchFamily="34" charset="0"/>
-                <a:ea typeface="Tahoma" panose="020B0604030504040204" pitchFamily="34" charset="0"/>
-                <a:cs typeface="Tahoma" panose="020B0604030504040204" pitchFamily="34" charset="0"/>
-              </a:rPr>
-              <a:t>	</a:t>
-            </a:r>
-            <a:r>
               <a:rPr lang="en-US" dirty="0" smtClean="0">
                 <a:latin typeface="Tahoma" panose="020B0604030504040204" pitchFamily="34" charset="0"/>
                 <a:ea typeface="Tahoma" panose="020B0604030504040204" pitchFamily="34" charset="0"/>
@@ -25589,14 +25604,6 @@
               <a:t>	</a:t>
             </a:r>
             <a:r>
-              <a:rPr lang="vi-VN" dirty="0" smtClean="0">
-                <a:latin typeface="Tahoma" panose="020B0604030504040204" pitchFamily="34" charset="0"/>
-                <a:ea typeface="Tahoma" panose="020B0604030504040204" pitchFamily="34" charset="0"/>
-                <a:cs typeface="Tahoma" panose="020B0604030504040204" pitchFamily="34" charset="0"/>
-              </a:rPr>
-              <a:t>	</a:t>
-            </a:r>
-            <a:r>
               <a:rPr lang="en-US" dirty="0" err="1" smtClean="0">
                 <a:latin typeface="Tahoma" panose="020B0604030504040204" pitchFamily="34" charset="0"/>
                 <a:ea typeface="Tahoma" panose="020B0604030504040204" pitchFamily="34" charset="0"/>
@@ -25660,14 +25667,6 @@
               <a:t>	</a:t>
             </a:r>
             <a:r>
-              <a:rPr lang="vi-VN" dirty="0" smtClean="0">
-                <a:latin typeface="Tahoma" panose="020B0604030504040204" pitchFamily="34" charset="0"/>
-                <a:ea typeface="Tahoma" panose="020B0604030504040204" pitchFamily="34" charset="0"/>
-                <a:cs typeface="Tahoma" panose="020B0604030504040204" pitchFamily="34" charset="0"/>
-              </a:rPr>
-              <a:t>	</a:t>
-            </a:r>
-            <a:r>
               <a:rPr lang="en-US" dirty="0" err="1" smtClean="0">
                 <a:latin typeface="Tahoma" panose="020B0604030504040204" pitchFamily="34" charset="0"/>
                 <a:ea typeface="Tahoma" panose="020B0604030504040204" pitchFamily="34" charset="0"/>
@@ -25747,14 +25746,6 @@
               <a:t>	</a:t>
             </a:r>
             <a:r>
-              <a:rPr lang="vi-VN" dirty="0" smtClean="0">
-                <a:latin typeface="Tahoma" panose="020B0604030504040204" pitchFamily="34" charset="0"/>
-                <a:ea typeface="Tahoma" panose="020B0604030504040204" pitchFamily="34" charset="0"/>
-                <a:cs typeface="Tahoma" panose="020B0604030504040204" pitchFamily="34" charset="0"/>
-              </a:rPr>
-              <a:t>	</a:t>
-            </a:r>
-            <a:r>
               <a:rPr lang="en-US" dirty="0" err="1" smtClean="0">
                 <a:latin typeface="Tahoma" panose="020B0604030504040204" pitchFamily="34" charset="0"/>
                 <a:ea typeface="Tahoma" panose="020B0604030504040204" pitchFamily="34" charset="0"/>
@@ -25786,14 +25777,6 @@
               <a:t>	</a:t>
             </a:r>
             <a:r>
-              <a:rPr lang="vi-VN" dirty="0" smtClean="0">
-                <a:latin typeface="Tahoma" panose="020B0604030504040204" pitchFamily="34" charset="0"/>
-                <a:ea typeface="Tahoma" panose="020B0604030504040204" pitchFamily="34" charset="0"/>
-                <a:cs typeface="Tahoma" panose="020B0604030504040204" pitchFamily="34" charset="0"/>
-              </a:rPr>
-              <a:t>	</a:t>
-            </a:r>
-            <a:r>
               <a:rPr lang="en-US" dirty="0" err="1" smtClean="0">
                 <a:latin typeface="Tahoma" panose="020B0604030504040204" pitchFamily="34" charset="0"/>
                 <a:ea typeface="Tahoma" panose="020B0604030504040204" pitchFamily="34" charset="0"/>
@@ -25817,12 +25800,20 @@
           </a:p>
           <a:p>
             <a:r>
+              <a:rPr lang="vi-VN" dirty="0">
+                <a:latin typeface="Tahoma" panose="020B0604030504040204" pitchFamily="34" charset="0"/>
+                <a:ea typeface="Tahoma" panose="020B0604030504040204" pitchFamily="34" charset="0"/>
+                <a:cs typeface="Tahoma" panose="020B0604030504040204" pitchFamily="34" charset="0"/>
+              </a:rPr>
+              <a:t> </a:t>
+            </a:r>
+            <a:r>
               <a:rPr lang="vi-VN" dirty="0" smtClean="0">
                 <a:latin typeface="Tahoma" panose="020B0604030504040204" pitchFamily="34" charset="0"/>
                 <a:ea typeface="Tahoma" panose="020B0604030504040204" pitchFamily="34" charset="0"/>
                 <a:cs typeface="Tahoma" panose="020B0604030504040204" pitchFamily="34" charset="0"/>
               </a:rPr>
-              <a:t>		</a:t>
+              <a:t>         </a:t>
             </a:r>
             <a:r>
               <a:rPr lang="en-US" dirty="0" smtClean="0">
@@ -25840,12 +25831,20 @@
           </a:p>
           <a:p>
             <a:r>
+              <a:rPr lang="vi-VN" dirty="0">
+                <a:latin typeface="Tahoma" panose="020B0604030504040204" pitchFamily="34" charset="0"/>
+                <a:ea typeface="Tahoma" panose="020B0604030504040204" pitchFamily="34" charset="0"/>
+                <a:cs typeface="Tahoma" panose="020B0604030504040204" pitchFamily="34" charset="0"/>
+              </a:rPr>
+              <a:t> </a:t>
+            </a:r>
+            <a:r>
               <a:rPr lang="vi-VN" dirty="0" smtClean="0">
                 <a:latin typeface="Tahoma" panose="020B0604030504040204" pitchFamily="34" charset="0"/>
                 <a:ea typeface="Tahoma" panose="020B0604030504040204" pitchFamily="34" charset="0"/>
                 <a:cs typeface="Tahoma" panose="020B0604030504040204" pitchFamily="34" charset="0"/>
               </a:rPr>
-              <a:t>	</a:t>
+              <a:t>    </a:t>
             </a:r>
             <a:r>
               <a:rPr lang="en-US" dirty="0" smtClean="0">
@@ -26984,6 +26983,14 @@
 </file>
 
 <file path=customXml/item1.xml><?xml version="1.0" encoding="utf-8"?>
+<p:properties xmlns:p="http://schemas.microsoft.com/office/2006/metadata/properties" xmlns:xsi="http://www.w3.org/2001/XMLSchema-instance" xmlns:pc="http://schemas.microsoft.com/office/infopath/2007/PartnerControls">
+  <documentManagement>
+    <MediaServiceKeyPoints xmlns="71af3243-3dd4-4a8d-8c0d-dd76da1f02a5" xsi:nil="true"/>
+  </documentManagement>
+</p:properties>
+</file>
+
+<file path=customXml/item2.xml><?xml version="1.0" encoding="utf-8"?>
 <ct:contentTypeSchema xmlns:ct="http://schemas.microsoft.com/office/2006/metadata/contentType" xmlns:ma="http://schemas.microsoft.com/office/2006/metadata/properties/metaAttributes" ct:_="" ma:_="" ma:contentTypeName="Document" ma:contentTypeID="0x01010079F111ED35F8CC479449609E8A0923A6" ma:contentTypeVersion="11" ma:contentTypeDescription="Create a new document." ma:contentTypeScope="" ma:versionID="9677210f24a1be23c92c90fd886aa0aa">
   <xsd:schema xmlns:xsd="http://www.w3.org/2001/XMLSchema" xmlns:xs="http://www.w3.org/2001/XMLSchema" xmlns:p="http://schemas.microsoft.com/office/2006/metadata/properties" xmlns:ns2="71af3243-3dd4-4a8d-8c0d-dd76da1f02a5" xmlns:ns3="16c05727-aa75-4e4a-9b5f-8a80a1165891" targetNamespace="http://schemas.microsoft.com/office/2006/metadata/properties" ma:root="true" ma:fieldsID="60e05723c5c1908df1a1a4ebf11d344e" ns2:_="" ns3:_="">
     <xsd:import namespace="71af3243-3dd4-4a8d-8c0d-dd76da1f02a5"/>
@@ -27194,14 +27201,6 @@
 </ct:contentTypeSchema>
 </file>
 
-<file path=customXml/item2.xml><?xml version="1.0" encoding="utf-8"?>
-<p:properties xmlns:p="http://schemas.microsoft.com/office/2006/metadata/properties" xmlns:xsi="http://www.w3.org/2001/XMLSchema-instance" xmlns:pc="http://schemas.microsoft.com/office/infopath/2007/PartnerControls">
-  <documentManagement>
-    <MediaServiceKeyPoints xmlns="71af3243-3dd4-4a8d-8c0d-dd76da1f02a5" xsi:nil="true"/>
-  </documentManagement>
-</p:properties>
-</file>
-
 <file path=customXml/item3.xml><?xml version="1.0" encoding="utf-8"?>
 <?mso-contentType ?>
 <FormTemplates xmlns="http://schemas.microsoft.com/sharepoint/v3/contenttype/forms">
@@ -27212,6 +27211,16 @@
 </file>
 
 <file path=customXml/itemProps1.xml><?xml version="1.0" encoding="utf-8"?>
+<ds:datastoreItem xmlns:ds="http://schemas.openxmlformats.org/officeDocument/2006/customXml" ds:itemID="{330CE401-796E-4493-905E-4DDA5AF62AB4}">
+  <ds:schemaRefs>
+    <ds:schemaRef ds:uri="http://schemas.microsoft.com/office/2006/metadata/properties"/>
+    <ds:schemaRef ds:uri="http://schemas.microsoft.com/office/infopath/2007/PartnerControls"/>
+    <ds:schemaRef ds:uri="71af3243-3dd4-4a8d-8c0d-dd76da1f02a5"/>
+  </ds:schemaRefs>
+</ds:datastoreItem>
+</file>
+
+<file path=customXml/itemProps2.xml><?xml version="1.0" encoding="utf-8"?>
 <ds:datastoreItem xmlns:ds="http://schemas.openxmlformats.org/officeDocument/2006/customXml" ds:itemID="{F2949B46-24C4-420B-AB49-DDC88FEB99BF}">
   <ds:schemaRefs>
     <ds:schemaRef ds:uri="http://schemas.microsoft.com/office/2006/metadata/contentType"/>
@@ -27230,16 +27239,6 @@
 </ds:datastoreItem>
 </file>
 
-<file path=customXml/itemProps2.xml><?xml version="1.0" encoding="utf-8"?>
-<ds:datastoreItem xmlns:ds="http://schemas.openxmlformats.org/officeDocument/2006/customXml" ds:itemID="{330CE401-796E-4493-905E-4DDA5AF62AB4}">
-  <ds:schemaRefs>
-    <ds:schemaRef ds:uri="http://schemas.microsoft.com/office/2006/metadata/properties"/>
-    <ds:schemaRef ds:uri="http://schemas.microsoft.com/office/infopath/2007/PartnerControls"/>
-    <ds:schemaRef ds:uri="71af3243-3dd4-4a8d-8c0d-dd76da1f02a5"/>
-  </ds:schemaRefs>
-</ds:datastoreItem>
-</file>
-
 <file path=customXml/itemProps3.xml><?xml version="1.0" encoding="utf-8"?>
 <ds:datastoreItem xmlns:ds="http://schemas.openxmlformats.org/officeDocument/2006/customXml" ds:itemID="{0D46D58D-B27D-4B23-AEA1-AE974AB62218}">
   <ds:schemaRefs>

</xml_diff>